<commit_message>
final presentation and explanatory note
</commit_message>
<xml_diff>
--- a/docs/exam_preparation.pptx
+++ b/docs/exam_preparation.pptx
@@ -7,6 +7,9 @@
   <p:sldIdLst>
     <p:sldId id="256" r:id="rId2"/>
     <p:sldId id="257" r:id="rId3"/>
+    <p:sldId id="258" r:id="rId4"/>
+    <p:sldId id="259" r:id="rId5"/>
+    <p:sldId id="260" r:id="rId6"/>
   </p:sldIdLst>
   <p:sldSz cx="12192000" cy="6858000"/>
   <p:notesSz cx="6858000" cy="9144000"/>
@@ -105,6 +108,11 @@
       </a:defRPr>
     </a:lvl9pPr>
   </p:defaultTextStyle>
+  <p:extLst>
+    <p:ext uri="{EFAFB233-063F-42B5-8137-9DF3F51BA10A}">
+      <p15:sldGuideLst xmlns:p15="http://schemas.microsoft.com/office/powerpoint/2012/main"/>
+    </p:ext>
+  </p:extLst>
 </p:presentation>
 </file>
 
@@ -278,7 +286,7 @@
           <a:p>
             <a:fld id="{48A87A34-81AB-432B-8DAE-1953F412C126}" type="datetimeFigureOut">
               <a:rPr lang="en-US" dirty="0"/>
-              <a:t>4/18/2023</a:t>
+              <a:t>4/19/2023</a:t>
             </a:fld>
             <a:endParaRPr lang="en-US" dirty="0"/>
           </a:p>
@@ -540,7 +548,7 @@
           <a:p>
             <a:fld id="{48A87A34-81AB-432B-8DAE-1953F412C126}" type="datetimeFigureOut">
               <a:rPr lang="en-US" dirty="0"/>
-              <a:t>4/18/2023</a:t>
+              <a:t>4/19/2023</a:t>
             </a:fld>
             <a:endParaRPr lang="en-US" dirty="0"/>
           </a:p>
@@ -767,7 +775,7 @@
             <a:fld id="{48A87A34-81AB-432B-8DAE-1953F412C126}" type="datetimeFigureOut">
               <a:rPr lang="en-US" dirty="0"/>
               <a:pPr/>
-              <a:t>4/18/2023</a:t>
+              <a:t>4/19/2023</a:t>
             </a:fld>
             <a:endParaRPr lang="en-US" dirty="0"/>
           </a:p>
@@ -1073,7 +1081,7 @@
             <a:fld id="{48A87A34-81AB-432B-8DAE-1953F412C126}" type="datetimeFigureOut">
               <a:rPr lang="en-US" dirty="0"/>
               <a:pPr/>
-              <a:t>4/18/2023</a:t>
+              <a:t>4/19/2023</a:t>
             </a:fld>
             <a:endParaRPr lang="en-US" dirty="0"/>
           </a:p>
@@ -1542,7 +1550,7 @@
             <a:fld id="{48A87A34-81AB-432B-8DAE-1953F412C126}" type="datetimeFigureOut">
               <a:rPr lang="en-US" dirty="0"/>
               <a:pPr/>
-              <a:t>4/18/2023</a:t>
+              <a:t>4/19/2023</a:t>
             </a:fld>
             <a:endParaRPr lang="en-US" dirty="0"/>
           </a:p>
@@ -2084,7 +2092,7 @@
           <a:p>
             <a:fld id="{48A87A34-81AB-432B-8DAE-1953F412C126}" type="datetimeFigureOut">
               <a:rPr lang="en-US" dirty="0"/>
-              <a:t>4/18/2023</a:t>
+              <a:t>4/19/2023</a:t>
             </a:fld>
             <a:endParaRPr lang="en-US" dirty="0"/>
           </a:p>
@@ -2853,7 +2861,7 @@
           <a:p>
             <a:fld id="{48A87A34-81AB-432B-8DAE-1953F412C126}" type="datetimeFigureOut">
               <a:rPr lang="en-US" dirty="0"/>
-              <a:t>4/18/2023</a:t>
+              <a:t>4/19/2023</a:t>
             </a:fld>
             <a:endParaRPr lang="en-US" dirty="0"/>
           </a:p>
@@ -3023,7 +3031,7 @@
           <a:p>
             <a:fld id="{48A87A34-81AB-432B-8DAE-1953F412C126}" type="datetimeFigureOut">
               <a:rPr lang="en-US" dirty="0"/>
-              <a:t>4/18/2023</a:t>
+              <a:t>4/19/2023</a:t>
             </a:fld>
             <a:endParaRPr lang="en-US" dirty="0"/>
           </a:p>
@@ -3242,7 +3250,7 @@
             <a:fld id="{48A87A34-81AB-432B-8DAE-1953F412C126}" type="datetimeFigureOut">
               <a:rPr lang="en-US" dirty="0"/>
               <a:pPr/>
-              <a:t>4/18/2023</a:t>
+              <a:t>4/19/2023</a:t>
             </a:fld>
             <a:endParaRPr lang="en-US" dirty="0"/>
           </a:p>
@@ -3417,7 +3425,7 @@
           <a:p>
             <a:fld id="{48A87A34-81AB-432B-8DAE-1953F412C126}" type="datetimeFigureOut">
               <a:rPr lang="en-US" dirty="0"/>
-              <a:t>4/18/2023</a:t>
+              <a:t>4/19/2023</a:t>
             </a:fld>
             <a:endParaRPr lang="en-US" dirty="0"/>
           </a:p>
@@ -3702,7 +3710,7 @@
             <a:fld id="{48A87A34-81AB-432B-8DAE-1953F412C126}" type="datetimeFigureOut">
               <a:rPr lang="en-US" dirty="0"/>
               <a:pPr/>
-              <a:t>4/18/2023</a:t>
+              <a:t>4/19/2023</a:t>
             </a:fld>
             <a:endParaRPr lang="en-US" dirty="0"/>
           </a:p>
@@ -3939,7 +3947,7 @@
           <a:p>
             <a:fld id="{48A87A34-81AB-432B-8DAE-1953F412C126}" type="datetimeFigureOut">
               <a:rPr lang="en-US" dirty="0"/>
-              <a:t>4/18/2023</a:t>
+              <a:t>4/19/2023</a:t>
             </a:fld>
             <a:endParaRPr lang="en-US" dirty="0"/>
           </a:p>
@@ -4313,7 +4321,7 @@
           <a:p>
             <a:fld id="{48A87A34-81AB-432B-8DAE-1953F412C126}" type="datetimeFigureOut">
               <a:rPr lang="en-US" dirty="0"/>
-              <a:t>4/18/2023</a:t>
+              <a:t>4/19/2023</a:t>
             </a:fld>
             <a:endParaRPr lang="en-US" dirty="0"/>
           </a:p>
@@ -4426,7 +4434,7 @@
           <a:p>
             <a:fld id="{48A87A34-81AB-432B-8DAE-1953F412C126}" type="datetimeFigureOut">
               <a:rPr lang="en-US" dirty="0"/>
-              <a:t>4/18/2023</a:t>
+              <a:t>4/19/2023</a:t>
             </a:fld>
             <a:endParaRPr lang="en-US" dirty="0"/>
           </a:p>
@@ -4516,7 +4524,7 @@
           <a:p>
             <a:fld id="{48A87A34-81AB-432B-8DAE-1953F412C126}" type="datetimeFigureOut">
               <a:rPr lang="en-US" dirty="0"/>
-              <a:t>4/18/2023</a:t>
+              <a:t>4/19/2023</a:t>
             </a:fld>
             <a:endParaRPr lang="en-US" dirty="0"/>
           </a:p>
@@ -4760,7 +4768,7 @@
           <a:p>
             <a:fld id="{48A87A34-81AB-432B-8DAE-1953F412C126}" type="datetimeFigureOut">
               <a:rPr lang="en-US" dirty="0"/>
-              <a:t>4/18/2023</a:t>
+              <a:t>4/19/2023</a:t>
             </a:fld>
             <a:endParaRPr lang="en-US" dirty="0"/>
           </a:p>
@@ -5012,7 +5020,7 @@
           <a:p>
             <a:fld id="{48A87A34-81AB-432B-8DAE-1953F412C126}" type="datetimeFigureOut">
               <a:rPr lang="en-US" dirty="0"/>
-              <a:t>4/18/2023</a:t>
+              <a:t>4/19/2023</a:t>
             </a:fld>
             <a:endParaRPr lang="en-US" dirty="0"/>
           </a:p>
@@ -5251,7 +5259,7 @@
             <a:fld id="{48A87A34-81AB-432B-8DAE-1953F412C126}" type="datetimeFigureOut">
               <a:rPr lang="en-US" dirty="0"/>
               <a:pPr/>
-              <a:t>4/18/2023</a:t>
+              <a:t>4/19/2023</a:t>
             </a:fld>
             <a:endParaRPr lang="en-US" dirty="0"/>
           </a:p>
@@ -5811,113 +5819,455 @@
           </a:xfrm>
         </p:spPr>
         <p:txBody>
-          <a:bodyPr/>
+          <a:bodyPr>
+            <a:normAutofit/>
+          </a:bodyPr>
           <a:lstStyle/>
           <a:p>
             <a:r>
-              <a:rPr lang="ru-RU" dirty="0" smtClean="0"/>
+              <a:rPr lang="ru-RU" sz="2000" dirty="0" smtClean="0">
+                <a:solidFill>
+                  <a:schemeClr val="accent1">
+                    <a:lumMod val="60000"/>
+                    <a:lumOff val="40000"/>
+                  </a:schemeClr>
+                </a:solidFill>
+              </a:rPr>
               <a:t>Идея</a:t>
             </a:r>
             <a:r>
-              <a:rPr lang="en-US" dirty="0" smtClean="0"/>
+              <a:rPr lang="en-US" sz="2000" dirty="0" smtClean="0">
+                <a:solidFill>
+                  <a:schemeClr val="accent1">
+                    <a:lumMod val="60000"/>
+                    <a:lumOff val="40000"/>
+                  </a:schemeClr>
+                </a:solidFill>
+              </a:rPr>
               <a:t> </a:t>
             </a:r>
             <a:r>
-              <a:rPr lang="ru-RU" dirty="0" smtClean="0"/>
+              <a:rPr lang="ru-RU" sz="2000" dirty="0" smtClean="0">
+                <a:solidFill>
+                  <a:schemeClr val="accent1">
+                    <a:lumMod val="60000"/>
+                    <a:lumOff val="40000"/>
+                  </a:schemeClr>
+                </a:solidFill>
+              </a:rPr>
               <a:t>и для чего создан</a:t>
             </a:r>
             <a:r>
-              <a:rPr lang="en-US" dirty="0" smtClean="0"/>
+              <a:rPr lang="en-US" sz="2000" dirty="0" smtClean="0">
+                <a:solidFill>
+                  <a:schemeClr val="accent1">
+                    <a:lumMod val="60000"/>
+                    <a:lumOff val="40000"/>
+                  </a:schemeClr>
+                </a:solidFill>
+              </a:rPr>
               <a:t>:</a:t>
             </a:r>
           </a:p>
           <a:p>
             <a:r>
-              <a:rPr lang="en-US" dirty="0"/>
+              <a:rPr lang="en-US" sz="1800" dirty="0">
+                <a:solidFill>
+                  <a:schemeClr val="accent3">
+                    <a:lumMod val="75000"/>
+                  </a:schemeClr>
+                </a:solidFill>
+              </a:rPr>
               <a:t>	</a:t>
             </a:r>
             <a:r>
-              <a:rPr lang="ru-RU" dirty="0" smtClean="0"/>
-              <a:t>Большинство школьников, заканчивающие 9-ые и 11-ые классы сдают экзамены (ОГЭ</a:t>
-            </a:r>
-            <a:r>
-              <a:rPr lang="en-US" dirty="0" smtClean="0"/>
+              <a:rPr lang="ru-RU" sz="1800" dirty="0" smtClean="0">
+                <a:solidFill>
+                  <a:schemeClr val="accent3">
+                    <a:lumMod val="75000"/>
+                  </a:schemeClr>
+                </a:solidFill>
+              </a:rPr>
+              <a:t>Большинство школьников, заканчивающие 9-ые и 11-ые классы сдают экзамены </a:t>
+            </a:r>
+            <a:r>
+              <a:rPr lang="ru-RU" sz="1800" dirty="0" smtClean="0">
+                <a:solidFill>
+                  <a:schemeClr val="accent3">
+                    <a:lumMod val="75000"/>
+                  </a:schemeClr>
+                </a:solidFill>
+              </a:rPr>
+              <a:t>	(</a:t>
+            </a:r>
+            <a:r>
+              <a:rPr lang="ru-RU" sz="1800" dirty="0" smtClean="0">
+                <a:solidFill>
+                  <a:schemeClr val="accent3">
+                    <a:lumMod val="75000"/>
+                  </a:schemeClr>
+                </a:solidFill>
+              </a:rPr>
+              <a:t>ОГЭ</a:t>
+            </a:r>
+            <a:r>
+              <a:rPr lang="en-US" sz="1800" dirty="0" smtClean="0">
+                <a:solidFill>
+                  <a:schemeClr val="accent3">
+                    <a:lumMod val="75000"/>
+                  </a:schemeClr>
+                </a:solidFill>
+              </a:rPr>
               <a:t>/</a:t>
             </a:r>
             <a:r>
-              <a:rPr lang="ru-RU" dirty="0" smtClean="0"/>
-              <a:t>ЕГЭ)  по   	информатике.  Для облегчения в подготовки я захотел создать бота, который будет  	помогать в этом и дружественно разговаривать с пользователем. Также была идея создать 	сайт по теории, чтобы человек мог изучить все необходимые знания для решения задач. Задачи 	планировалось взять только из сферы программирования.</a:t>
-            </a:r>
-          </a:p>
-          <a:p>
-            <a:r>
-              <a:rPr lang="ru-RU" dirty="0" smtClean="0"/>
+              <a:rPr lang="ru-RU" sz="1800" dirty="0" smtClean="0">
+                <a:solidFill>
+                  <a:schemeClr val="accent3">
+                    <a:lumMod val="75000"/>
+                  </a:schemeClr>
+                </a:solidFill>
+              </a:rPr>
+              <a:t>ЕГЭ)  по   	информатике.  Для облегчения в подготовки я захотел создать бота, </a:t>
+            </a:r>
+            <a:r>
+              <a:rPr lang="ru-RU" sz="1800" dirty="0" smtClean="0">
+                <a:solidFill>
+                  <a:schemeClr val="accent3">
+                    <a:lumMod val="75000"/>
+                  </a:schemeClr>
+                </a:solidFill>
+              </a:rPr>
+              <a:t>	который </a:t>
+            </a:r>
+            <a:r>
+              <a:rPr lang="ru-RU" sz="1800" dirty="0" smtClean="0">
+                <a:solidFill>
+                  <a:schemeClr val="accent3">
+                    <a:lumMod val="75000"/>
+                  </a:schemeClr>
+                </a:solidFill>
+              </a:rPr>
+              <a:t>будет  	помогать в этом и дружественно разговаривать с пользователем. </a:t>
+            </a:r>
+            <a:r>
+              <a:rPr lang="ru-RU" sz="1800" dirty="0" smtClean="0">
+                <a:solidFill>
+                  <a:schemeClr val="accent3">
+                    <a:lumMod val="75000"/>
+                  </a:schemeClr>
+                </a:solidFill>
+              </a:rPr>
+              <a:t>	Также </a:t>
+            </a:r>
+            <a:r>
+              <a:rPr lang="ru-RU" sz="1800" dirty="0" smtClean="0">
+                <a:solidFill>
+                  <a:schemeClr val="accent3">
+                    <a:lumMod val="75000"/>
+                  </a:schemeClr>
+                </a:solidFill>
+              </a:rPr>
+              <a:t>была идея создать </a:t>
+            </a:r>
+            <a:r>
+              <a:rPr lang="ru-RU" sz="1800" dirty="0" smtClean="0">
+                <a:solidFill>
+                  <a:schemeClr val="accent3">
+                    <a:lumMod val="75000"/>
+                  </a:schemeClr>
+                </a:solidFill>
+              </a:rPr>
+              <a:t>сайт </a:t>
+            </a:r>
+            <a:r>
+              <a:rPr lang="ru-RU" sz="1800" dirty="0" smtClean="0">
+                <a:solidFill>
+                  <a:schemeClr val="accent3">
+                    <a:lumMod val="75000"/>
+                  </a:schemeClr>
+                </a:solidFill>
+              </a:rPr>
+              <a:t>по теории, чтобы человек мог изучить все </a:t>
+            </a:r>
+            <a:r>
+              <a:rPr lang="ru-RU" sz="1800" dirty="0" smtClean="0">
+                <a:solidFill>
+                  <a:schemeClr val="accent3">
+                    <a:lumMod val="75000"/>
+                  </a:schemeClr>
+                </a:solidFill>
+              </a:rPr>
+              <a:t>	необходимые </a:t>
+            </a:r>
+            <a:r>
+              <a:rPr lang="ru-RU" sz="1800" dirty="0" smtClean="0">
+                <a:solidFill>
+                  <a:schemeClr val="accent3">
+                    <a:lumMod val="75000"/>
+                  </a:schemeClr>
+                </a:solidFill>
+              </a:rPr>
+              <a:t>знания для решения задач. Задачи </a:t>
+            </a:r>
+            <a:r>
+              <a:rPr lang="ru-RU" sz="1800" dirty="0" smtClean="0">
+                <a:solidFill>
+                  <a:schemeClr val="accent3">
+                    <a:lumMod val="75000"/>
+                  </a:schemeClr>
+                </a:solidFill>
+              </a:rPr>
+              <a:t>планировалось </a:t>
+            </a:r>
+            <a:r>
+              <a:rPr lang="ru-RU" sz="1800" dirty="0" smtClean="0">
+                <a:solidFill>
+                  <a:schemeClr val="accent3">
+                    <a:lumMod val="75000"/>
+                  </a:schemeClr>
+                </a:solidFill>
+              </a:rPr>
+              <a:t>взять только из </a:t>
+            </a:r>
+            <a:r>
+              <a:rPr lang="ru-RU" sz="1800" dirty="0" smtClean="0">
+                <a:solidFill>
+                  <a:schemeClr val="accent3">
+                    <a:lumMod val="75000"/>
+                  </a:schemeClr>
+                </a:solidFill>
+              </a:rPr>
+              <a:t>	сферы </a:t>
+            </a:r>
+            <a:r>
+              <a:rPr lang="ru-RU" sz="1800" dirty="0" smtClean="0">
+                <a:solidFill>
+                  <a:schemeClr val="accent3">
+                    <a:lumMod val="75000"/>
+                  </a:schemeClr>
+                </a:solidFill>
+              </a:rPr>
+              <a:t>программирования.</a:t>
+            </a:r>
+          </a:p>
+          <a:p>
+            <a:r>
+              <a:rPr lang="ru-RU" sz="2000" dirty="0" smtClean="0">
+                <a:solidFill>
+                  <a:schemeClr val="accent1">
+                    <a:lumMod val="60000"/>
+                    <a:lumOff val="40000"/>
+                  </a:schemeClr>
+                </a:solidFill>
+              </a:rPr>
               <a:t>Структура бота</a:t>
             </a:r>
             <a:r>
-              <a:rPr lang="en-US" dirty="0" smtClean="0"/>
+              <a:rPr lang="en-US" sz="2000" dirty="0" smtClean="0">
+                <a:solidFill>
+                  <a:schemeClr val="accent1">
+                    <a:lumMod val="60000"/>
+                    <a:lumOff val="40000"/>
+                  </a:schemeClr>
+                </a:solidFill>
+              </a:rPr>
               <a:t>:</a:t>
             </a:r>
           </a:p>
           <a:p>
             <a:r>
-              <a:rPr lang="en-US" dirty="0"/>
-              <a:t>	-</a:t>
-            </a:r>
-            <a:r>
-              <a:rPr lang="ru-RU" dirty="0" smtClean="0"/>
+              <a:rPr lang="en-US" sz="1400" dirty="0">
+                <a:solidFill>
+                  <a:schemeClr val="accent3">
+                    <a:lumMod val="75000"/>
+                  </a:schemeClr>
+                </a:solidFill>
+              </a:rPr>
+              <a:t>	</a:t>
+            </a:r>
+            <a:r>
+              <a:rPr lang="en-US" dirty="0">
+                <a:solidFill>
+                  <a:schemeClr val="accent3">
+                    <a:lumMod val="75000"/>
+                  </a:schemeClr>
+                </a:solidFill>
+              </a:rPr>
+              <a:t>-</a:t>
+            </a:r>
+            <a:r>
+              <a:rPr lang="ru-RU" dirty="0" smtClean="0">
+                <a:solidFill>
+                  <a:schemeClr val="accent3">
+                    <a:lumMod val="75000"/>
+                  </a:schemeClr>
+                </a:solidFill>
+              </a:rPr>
               <a:t> диалог о знакомстве с пользователем</a:t>
             </a:r>
-            <a:endParaRPr lang="en-US" dirty="0" smtClean="0"/>
-          </a:p>
-          <a:p>
-            <a:r>
-              <a:rPr lang="en-US" dirty="0"/>
+            <a:endParaRPr lang="en-US" dirty="0" smtClean="0">
+              <a:solidFill>
+                <a:schemeClr val="accent3">
+                  <a:lumMod val="75000"/>
+                </a:schemeClr>
+              </a:solidFill>
+            </a:endParaRPr>
+          </a:p>
+          <a:p>
+            <a:r>
+              <a:rPr lang="en-US" dirty="0">
+                <a:solidFill>
+                  <a:schemeClr val="accent3">
+                    <a:lumMod val="75000"/>
+                  </a:schemeClr>
+                </a:solidFill>
+              </a:rPr>
               <a:t>	</a:t>
             </a:r>
             <a:r>
-              <a:rPr lang="en-US" dirty="0" smtClean="0"/>
+              <a:rPr lang="en-US" dirty="0" smtClean="0">
+                <a:solidFill>
+                  <a:schemeClr val="accent3">
+                    <a:lumMod val="75000"/>
+                  </a:schemeClr>
+                </a:solidFill>
+              </a:rPr>
               <a:t>- </a:t>
             </a:r>
             <a:r>
-              <a:rPr lang="ru-RU" dirty="0" smtClean="0"/>
+              <a:rPr lang="ru-RU" dirty="0" smtClean="0">
+                <a:solidFill>
+                  <a:schemeClr val="accent3">
+                    <a:lumMod val="75000"/>
+                  </a:schemeClr>
+                </a:solidFill>
+              </a:rPr>
               <a:t>предложение создать профиль, чтобы бот мог его запомнить</a:t>
             </a:r>
           </a:p>
           <a:p>
             <a:r>
-              <a:rPr lang="ru-RU" dirty="0"/>
+              <a:rPr lang="ru-RU" dirty="0">
+                <a:solidFill>
+                  <a:schemeClr val="accent3">
+                    <a:lumMod val="75000"/>
+                  </a:schemeClr>
+                </a:solidFill>
+              </a:rPr>
               <a:t>	</a:t>
             </a:r>
             <a:r>
-              <a:rPr lang="ru-RU" dirty="0" smtClean="0"/>
+              <a:rPr lang="ru-RU" dirty="0" smtClean="0">
+                <a:solidFill>
+                  <a:schemeClr val="accent3">
+                    <a:lumMod val="75000"/>
+                  </a:schemeClr>
+                </a:solidFill>
+              </a:rPr>
               <a:t>- выбор практики или теории</a:t>
             </a:r>
           </a:p>
           <a:p>
             <a:r>
-              <a:rPr lang="ru-RU" dirty="0"/>
+              <a:rPr lang="ru-RU" sz="1400" dirty="0">
+                <a:solidFill>
+                  <a:schemeClr val="accent3">
+                    <a:lumMod val="75000"/>
+                  </a:schemeClr>
+                </a:solidFill>
+              </a:rPr>
               <a:t>	</a:t>
             </a:r>
             <a:r>
-              <a:rPr lang="ru-RU" dirty="0" smtClean="0"/>
-              <a:t>- если теория, то выдаётся ссылка на сайт, в котором расположена нужная информация.</a:t>
-            </a:r>
-          </a:p>
-          <a:p>
-            <a:r>
-              <a:rPr lang="ru-RU" dirty="0"/>
+              <a:rPr lang="ru-RU" dirty="0" smtClean="0">
+                <a:solidFill>
+                  <a:schemeClr val="accent3">
+                    <a:lumMod val="75000"/>
+                  </a:schemeClr>
+                </a:solidFill>
+              </a:rPr>
+              <a:t>- если теория, то выдаётся </a:t>
+            </a:r>
+            <a:r>
+              <a:rPr lang="ru-RU" dirty="0" smtClean="0">
+                <a:solidFill>
+                  <a:schemeClr val="accent3">
+                    <a:lumMod val="75000"/>
+                  </a:schemeClr>
+                </a:solidFill>
+              </a:rPr>
+              <a:t>ссылка </a:t>
+            </a:r>
+            <a:r>
+              <a:rPr lang="ru-RU" dirty="0" smtClean="0">
+                <a:solidFill>
+                  <a:schemeClr val="accent3">
+                    <a:lumMod val="75000"/>
+                  </a:schemeClr>
+                </a:solidFill>
+              </a:rPr>
+              <a:t>на сайт, в котором расположена нужная </a:t>
+            </a:r>
+            <a:r>
+              <a:rPr lang="ru-RU" dirty="0" smtClean="0">
+                <a:solidFill>
+                  <a:schemeClr val="accent3">
+                    <a:lumMod val="75000"/>
+                  </a:schemeClr>
+                </a:solidFill>
+              </a:rPr>
+              <a:t>информация</a:t>
+            </a:r>
+            <a:r>
+              <a:rPr lang="ru-RU" dirty="0" smtClean="0">
+                <a:solidFill>
+                  <a:schemeClr val="accent3">
+                    <a:lumMod val="75000"/>
+                  </a:schemeClr>
+                </a:solidFill>
+              </a:rPr>
+              <a:t>.</a:t>
+            </a:r>
+          </a:p>
+          <a:p>
+            <a:r>
+              <a:rPr lang="ru-RU" sz="1400" dirty="0">
+                <a:solidFill>
+                  <a:schemeClr val="accent3">
+                    <a:lumMod val="75000"/>
+                  </a:schemeClr>
+                </a:solidFill>
+              </a:rPr>
               <a:t>	</a:t>
             </a:r>
             <a:r>
-              <a:rPr lang="ru-RU" dirty="0" smtClean="0"/>
-              <a:t>  если практика, то пользователю даётся выбор, готовиться к ОГЭ или ЕГЭ. После этого человек 	   выбирает уровень сложности и начинает </a:t>
-            </a:r>
-            <a:r>
-              <a:rPr lang="ru-RU" smtClean="0"/>
-              <a:t>проверять себя.</a:t>
-            </a:r>
-            <a:endParaRPr lang="ru-RU" dirty="0"/>
+              <a:rPr lang="ru-RU" sz="1400" dirty="0" smtClean="0">
+                <a:solidFill>
+                  <a:schemeClr val="accent3">
+                    <a:lumMod val="75000"/>
+                  </a:schemeClr>
+                </a:solidFill>
+              </a:rPr>
+              <a:t>- </a:t>
+            </a:r>
+            <a:r>
+              <a:rPr lang="ru-RU" dirty="0" smtClean="0">
+                <a:solidFill>
+                  <a:schemeClr val="accent3">
+                    <a:lumMod val="75000"/>
+                  </a:schemeClr>
+                </a:solidFill>
+              </a:rPr>
+              <a:t>если практика, то пользователю даётся выбор, готовиться к ОГЭ или ЕГЭ. После этого человек 	   выбирает уровень сложности и начинает проверять себя.</a:t>
+            </a:r>
+            <a:endParaRPr lang="ru-RU" sz="1400" dirty="0">
+              <a:solidFill>
+                <a:schemeClr val="accent3">
+                  <a:lumMod val="75000"/>
+                </a:schemeClr>
+              </a:solidFill>
+            </a:endParaRPr>
           </a:p>
         </p:txBody>
       </p:sp>
@@ -5979,6 +6329,1323 @@
     <p:extLst>
       <p:ext uri="{BB962C8B-B14F-4D97-AF65-F5344CB8AC3E}">
         <p14:creationId xmlns:p14="http://schemas.microsoft.com/office/powerpoint/2010/main" val="1546347464"/>
+      </p:ext>
+    </p:extLst>
+  </p:cSld>
+  <p:clrMapOvr>
+    <a:masterClrMapping/>
+  </p:clrMapOvr>
+</p:sld>
+</file>
+
+<file path=ppt/slides/slide3.xml><?xml version="1.0" encoding="utf-8"?>
+<p:sld xmlns:a="http://schemas.openxmlformats.org/drawingml/2006/main" xmlns:r="http://schemas.openxmlformats.org/officeDocument/2006/relationships" xmlns:p="http://schemas.openxmlformats.org/presentationml/2006/main">
+  <p:cSld>
+    <p:spTree>
+      <p:nvGrpSpPr>
+        <p:cNvPr id="1" name=""/>
+        <p:cNvGrpSpPr/>
+        <p:nvPr/>
+      </p:nvGrpSpPr>
+      <p:grpSpPr>
+        <a:xfrm>
+          <a:off x="0" y="0"/>
+          <a:ext cx="0" cy="0"/>
+          <a:chOff x="0" y="0"/>
+          <a:chExt cx="0" cy="0"/>
+        </a:xfrm>
+      </p:grpSpPr>
+      <p:sp>
+        <p:nvSpPr>
+          <p:cNvPr id="3" name="Подзаголовок 2"/>
+          <p:cNvSpPr>
+            <a:spLocks noGrp="1"/>
+          </p:cNvSpPr>
+          <p:nvPr>
+            <p:ph type="subTitle" idx="1"/>
+          </p:nvPr>
+        </p:nvSpPr>
+        <p:spPr>
+          <a:xfrm>
+            <a:off x="520151" y="393243"/>
+            <a:ext cx="2390028" cy="612251"/>
+          </a:xfrm>
+        </p:spPr>
+        <p:txBody>
+          <a:bodyPr>
+            <a:noAutofit/>
+          </a:bodyPr>
+          <a:lstStyle/>
+          <a:p>
+            <a:r>
+              <a:rPr lang="ru-RU" dirty="0" smtClean="0">
+                <a:solidFill>
+                  <a:schemeClr val="accent6">
+                    <a:lumMod val="20000"/>
+                    <a:lumOff val="80000"/>
+                  </a:schemeClr>
+                </a:solidFill>
+              </a:rPr>
+              <a:t>Использованные</a:t>
+            </a:r>
+          </a:p>
+          <a:p>
+            <a:r>
+              <a:rPr lang="en-US" dirty="0" smtClean="0">
+                <a:solidFill>
+                  <a:schemeClr val="accent6">
+                    <a:lumMod val="20000"/>
+                    <a:lumOff val="80000"/>
+                  </a:schemeClr>
+                </a:solidFill>
+              </a:rPr>
+              <a:t>   </a:t>
+            </a:r>
+            <a:r>
+              <a:rPr lang="ru-RU" dirty="0" smtClean="0">
+                <a:solidFill>
+                  <a:schemeClr val="accent6">
+                    <a:lumMod val="20000"/>
+                    <a:lumOff val="80000"/>
+                  </a:schemeClr>
+                </a:solidFill>
+              </a:rPr>
+              <a:t>Технологии</a:t>
+            </a:r>
+            <a:r>
+              <a:rPr lang="en-US" dirty="0" smtClean="0">
+                <a:solidFill>
+                  <a:schemeClr val="accent6">
+                    <a:lumMod val="20000"/>
+                    <a:lumOff val="80000"/>
+                  </a:schemeClr>
+                </a:solidFill>
+              </a:rPr>
+              <a:t>:</a:t>
+            </a:r>
+            <a:endParaRPr lang="ru-RU" dirty="0">
+              <a:solidFill>
+                <a:schemeClr val="accent6">
+                  <a:lumMod val="20000"/>
+                  <a:lumOff val="80000"/>
+                </a:schemeClr>
+              </a:solidFill>
+            </a:endParaRPr>
+          </a:p>
+        </p:txBody>
+      </p:sp>
+      <p:sp>
+        <p:nvSpPr>
+          <p:cNvPr id="4" name="Подзаголовок 2"/>
+          <p:cNvSpPr txBox="1">
+            <a:spLocks/>
+          </p:cNvSpPr>
+          <p:nvPr/>
+        </p:nvSpPr>
+        <p:spPr>
+          <a:xfrm>
+            <a:off x="1547855" y="1375576"/>
+            <a:ext cx="2205161" cy="4198289"/>
+          </a:xfrm>
+          <a:prstGeom prst="rect">
+            <a:avLst/>
+          </a:prstGeom>
+        </p:spPr>
+        <p:txBody>
+          <a:bodyPr vert="horz" lIns="91440" tIns="45720" rIns="91440" bIns="45720" rtlCol="0">
+            <a:normAutofit/>
+          </a:bodyPr>
+          <a:lstStyle>
+            <a:lvl1pPr marL="0" indent="0" algn="l" defTabSz="914400" rtl="0" eaLnBrk="1" latinLnBrk="0" hangingPunct="1">
+              <a:lnSpc>
+                <a:spcPct val="90000"/>
+              </a:lnSpc>
+              <a:spcBef>
+                <a:spcPts val="1000"/>
+              </a:spcBef>
+              <a:buFont typeface="Arial" panose="020B0604020202020204" pitchFamily="34" charset="0"/>
+              <a:buNone/>
+              <a:defRPr sz="2000" kern="1200">
+                <a:solidFill>
+                  <a:schemeClr val="tx1"/>
+                </a:solidFill>
+                <a:latin typeface="+mn-lt"/>
+                <a:ea typeface="+mn-ea"/>
+                <a:cs typeface="+mn-cs"/>
+              </a:defRPr>
+            </a:lvl1pPr>
+            <a:lvl2pPr marL="457200" indent="0" algn="ctr" defTabSz="914400" rtl="0" eaLnBrk="1" latinLnBrk="0" hangingPunct="1">
+              <a:lnSpc>
+                <a:spcPct val="90000"/>
+              </a:lnSpc>
+              <a:spcBef>
+                <a:spcPts val="500"/>
+              </a:spcBef>
+              <a:buFont typeface="Arial" panose="020B0604020202020204" pitchFamily="34" charset="0"/>
+              <a:buNone/>
+              <a:defRPr sz="2000" kern="1200">
+                <a:solidFill>
+                  <a:schemeClr val="tx1"/>
+                </a:solidFill>
+                <a:latin typeface="+mn-lt"/>
+                <a:ea typeface="+mn-ea"/>
+                <a:cs typeface="+mn-cs"/>
+              </a:defRPr>
+            </a:lvl2pPr>
+            <a:lvl3pPr marL="914400" indent="0" algn="ctr" defTabSz="914400" rtl="0" eaLnBrk="1" latinLnBrk="0" hangingPunct="1">
+              <a:lnSpc>
+                <a:spcPct val="90000"/>
+              </a:lnSpc>
+              <a:spcBef>
+                <a:spcPts val="500"/>
+              </a:spcBef>
+              <a:buFont typeface="Arial" panose="020B0604020202020204" pitchFamily="34" charset="0"/>
+              <a:buNone/>
+              <a:defRPr sz="1800" kern="1200">
+                <a:solidFill>
+                  <a:schemeClr val="tx1"/>
+                </a:solidFill>
+                <a:latin typeface="+mn-lt"/>
+                <a:ea typeface="+mn-ea"/>
+                <a:cs typeface="+mn-cs"/>
+              </a:defRPr>
+            </a:lvl3pPr>
+            <a:lvl4pPr marL="1371600" indent="0" algn="ctr" defTabSz="914400" rtl="0" eaLnBrk="1" latinLnBrk="0" hangingPunct="1">
+              <a:lnSpc>
+                <a:spcPct val="90000"/>
+              </a:lnSpc>
+              <a:spcBef>
+                <a:spcPts val="500"/>
+              </a:spcBef>
+              <a:buFont typeface="Arial" panose="020B0604020202020204" pitchFamily="34" charset="0"/>
+              <a:buNone/>
+              <a:defRPr sz="1600" kern="1200">
+                <a:solidFill>
+                  <a:schemeClr val="tx1"/>
+                </a:solidFill>
+                <a:latin typeface="+mn-lt"/>
+                <a:ea typeface="+mn-ea"/>
+                <a:cs typeface="+mn-cs"/>
+              </a:defRPr>
+            </a:lvl4pPr>
+            <a:lvl5pPr marL="1828800" indent="0" algn="ctr" defTabSz="914400" rtl="0" eaLnBrk="1" latinLnBrk="0" hangingPunct="1">
+              <a:lnSpc>
+                <a:spcPct val="90000"/>
+              </a:lnSpc>
+              <a:spcBef>
+                <a:spcPts val="500"/>
+              </a:spcBef>
+              <a:buFont typeface="Arial" panose="020B0604020202020204" pitchFamily="34" charset="0"/>
+              <a:buNone/>
+              <a:defRPr sz="1600" kern="1200">
+                <a:solidFill>
+                  <a:schemeClr val="tx1"/>
+                </a:solidFill>
+                <a:latin typeface="+mn-lt"/>
+                <a:ea typeface="+mn-ea"/>
+                <a:cs typeface="+mn-cs"/>
+              </a:defRPr>
+            </a:lvl5pPr>
+            <a:lvl6pPr marL="2286000" indent="0" algn="ctr" defTabSz="914400" rtl="0" eaLnBrk="1" latinLnBrk="0" hangingPunct="1">
+              <a:lnSpc>
+                <a:spcPct val="90000"/>
+              </a:lnSpc>
+              <a:spcBef>
+                <a:spcPts val="500"/>
+              </a:spcBef>
+              <a:buFont typeface="Arial" panose="020B0604020202020204" pitchFamily="34" charset="0"/>
+              <a:buNone/>
+              <a:defRPr sz="1600" kern="1200">
+                <a:solidFill>
+                  <a:schemeClr val="tx1"/>
+                </a:solidFill>
+                <a:latin typeface="+mn-lt"/>
+                <a:ea typeface="+mn-ea"/>
+                <a:cs typeface="+mn-cs"/>
+              </a:defRPr>
+            </a:lvl6pPr>
+            <a:lvl7pPr marL="2743200" indent="0" algn="ctr" defTabSz="914400" rtl="0" eaLnBrk="1" latinLnBrk="0" hangingPunct="1">
+              <a:lnSpc>
+                <a:spcPct val="90000"/>
+              </a:lnSpc>
+              <a:spcBef>
+                <a:spcPts val="500"/>
+              </a:spcBef>
+              <a:buFont typeface="Arial" panose="020B0604020202020204" pitchFamily="34" charset="0"/>
+              <a:buNone/>
+              <a:defRPr sz="1600" kern="1200">
+                <a:solidFill>
+                  <a:schemeClr val="tx1"/>
+                </a:solidFill>
+                <a:latin typeface="+mn-lt"/>
+                <a:ea typeface="+mn-ea"/>
+                <a:cs typeface="+mn-cs"/>
+              </a:defRPr>
+            </a:lvl7pPr>
+            <a:lvl8pPr marL="3200400" indent="0" algn="ctr" defTabSz="914400" rtl="0" eaLnBrk="1" latinLnBrk="0" hangingPunct="1">
+              <a:lnSpc>
+                <a:spcPct val="90000"/>
+              </a:lnSpc>
+              <a:spcBef>
+                <a:spcPts val="500"/>
+              </a:spcBef>
+              <a:buFont typeface="Arial" panose="020B0604020202020204" pitchFamily="34" charset="0"/>
+              <a:buNone/>
+              <a:defRPr sz="1600" kern="1200">
+                <a:solidFill>
+                  <a:schemeClr val="tx1"/>
+                </a:solidFill>
+                <a:latin typeface="+mn-lt"/>
+                <a:ea typeface="+mn-ea"/>
+                <a:cs typeface="+mn-cs"/>
+              </a:defRPr>
+            </a:lvl8pPr>
+            <a:lvl9pPr marL="3657600" indent="0" algn="ctr" defTabSz="914400" rtl="0" eaLnBrk="1" latinLnBrk="0" hangingPunct="1">
+              <a:lnSpc>
+                <a:spcPct val="90000"/>
+              </a:lnSpc>
+              <a:spcBef>
+                <a:spcPts val="500"/>
+              </a:spcBef>
+              <a:buFont typeface="Arial" panose="020B0604020202020204" pitchFamily="34" charset="0"/>
+              <a:buNone/>
+              <a:defRPr sz="1600" kern="1200">
+                <a:solidFill>
+                  <a:schemeClr val="tx1"/>
+                </a:solidFill>
+                <a:latin typeface="+mn-lt"/>
+                <a:ea typeface="+mn-ea"/>
+                <a:cs typeface="+mn-cs"/>
+              </a:defRPr>
+            </a:lvl9pPr>
+          </a:lstStyle>
+          <a:p>
+            <a:r>
+              <a:rPr lang="en-US" sz="1800" dirty="0" smtClean="0">
+                <a:solidFill>
+                  <a:schemeClr val="accent3">
+                    <a:lumMod val="75000"/>
+                  </a:schemeClr>
+                </a:solidFill>
+              </a:rPr>
+              <a:t>-</a:t>
+            </a:r>
+            <a:r>
+              <a:rPr lang="ru-RU" sz="1800" dirty="0" smtClean="0">
+                <a:solidFill>
+                  <a:schemeClr val="accent3">
+                    <a:lumMod val="75000"/>
+                  </a:schemeClr>
+                </a:solidFill>
+              </a:rPr>
+              <a:t> </a:t>
+            </a:r>
+            <a:r>
+              <a:rPr lang="en-US" sz="1800" dirty="0" smtClean="0">
+                <a:solidFill>
+                  <a:schemeClr val="accent3">
+                    <a:lumMod val="75000"/>
+                  </a:schemeClr>
+                </a:solidFill>
+              </a:rPr>
+              <a:t>Logging</a:t>
+            </a:r>
+          </a:p>
+          <a:p>
+            <a:r>
+              <a:rPr lang="ru-RU" sz="1800" dirty="0" smtClean="0">
+                <a:solidFill>
+                  <a:schemeClr val="accent3">
+                    <a:lumMod val="75000"/>
+                  </a:schemeClr>
+                </a:solidFill>
+              </a:rPr>
+              <a:t>- </a:t>
+            </a:r>
+            <a:r>
+              <a:rPr lang="en-US" sz="1800" dirty="0">
+                <a:solidFill>
+                  <a:schemeClr val="accent3">
+                    <a:lumMod val="75000"/>
+                  </a:schemeClr>
+                </a:solidFill>
+              </a:rPr>
+              <a:t>PIL</a:t>
+            </a:r>
+            <a:endParaRPr lang="ru-RU" sz="1800" dirty="0">
+              <a:solidFill>
+                <a:schemeClr val="accent3">
+                  <a:lumMod val="75000"/>
+                </a:schemeClr>
+              </a:solidFill>
+            </a:endParaRPr>
+          </a:p>
+          <a:p>
+            <a:r>
+              <a:rPr lang="ru-RU" sz="1800" dirty="0" smtClean="0">
+                <a:solidFill>
+                  <a:schemeClr val="accent3">
+                    <a:lumMod val="75000"/>
+                  </a:schemeClr>
+                </a:solidFill>
+              </a:rPr>
+              <a:t>- </a:t>
+            </a:r>
+            <a:r>
+              <a:rPr lang="en-US" sz="1800" dirty="0">
+                <a:solidFill>
+                  <a:schemeClr val="accent3">
+                    <a:lumMod val="75000"/>
+                  </a:schemeClr>
+                </a:solidFill>
+              </a:rPr>
+              <a:t>telegram</a:t>
+            </a:r>
+            <a:r>
+              <a:rPr lang="ru-RU" sz="1800" dirty="0">
+                <a:solidFill>
+                  <a:schemeClr val="accent3">
+                    <a:lumMod val="75000"/>
+                  </a:schemeClr>
+                </a:solidFill>
+              </a:rPr>
+              <a:t>.</a:t>
+            </a:r>
+            <a:r>
+              <a:rPr lang="en-US" sz="1800" dirty="0" err="1">
+                <a:solidFill>
+                  <a:schemeClr val="accent3">
+                    <a:lumMod val="75000"/>
+                  </a:schemeClr>
+                </a:solidFill>
+              </a:rPr>
+              <a:t>ext</a:t>
+            </a:r>
+            <a:endParaRPr lang="ru-RU" sz="1800" dirty="0">
+              <a:solidFill>
+                <a:schemeClr val="accent3">
+                  <a:lumMod val="75000"/>
+                </a:schemeClr>
+              </a:solidFill>
+            </a:endParaRPr>
+          </a:p>
+          <a:p>
+            <a:r>
+              <a:rPr lang="ru-RU" sz="1800" dirty="0" smtClean="0">
+                <a:solidFill>
+                  <a:schemeClr val="accent3">
+                    <a:lumMod val="75000"/>
+                  </a:schemeClr>
+                </a:solidFill>
+              </a:rPr>
+              <a:t>- </a:t>
+            </a:r>
+            <a:r>
+              <a:rPr lang="en-US" sz="1800" dirty="0">
+                <a:solidFill>
+                  <a:schemeClr val="accent3">
+                    <a:lumMod val="75000"/>
+                  </a:schemeClr>
+                </a:solidFill>
+              </a:rPr>
+              <a:t>telegram</a:t>
+            </a:r>
+            <a:endParaRPr lang="ru-RU" sz="1800" dirty="0">
+              <a:solidFill>
+                <a:schemeClr val="accent3">
+                  <a:lumMod val="75000"/>
+                </a:schemeClr>
+              </a:solidFill>
+            </a:endParaRPr>
+          </a:p>
+          <a:p>
+            <a:r>
+              <a:rPr lang="ru-RU" sz="1800" dirty="0" smtClean="0">
+                <a:solidFill>
+                  <a:schemeClr val="accent3">
+                    <a:lumMod val="75000"/>
+                  </a:schemeClr>
+                </a:solidFill>
+              </a:rPr>
+              <a:t>- </a:t>
+            </a:r>
+            <a:r>
+              <a:rPr lang="en-US" sz="1800" dirty="0">
+                <a:solidFill>
+                  <a:schemeClr val="accent3">
+                    <a:lumMod val="75000"/>
+                  </a:schemeClr>
+                </a:solidFill>
+              </a:rPr>
+              <a:t>sqlite3</a:t>
+            </a:r>
+            <a:endParaRPr lang="ru-RU" sz="1800" dirty="0">
+              <a:solidFill>
+                <a:schemeClr val="accent3">
+                  <a:lumMod val="75000"/>
+                </a:schemeClr>
+              </a:solidFill>
+            </a:endParaRPr>
+          </a:p>
+          <a:p>
+            <a:r>
+              <a:rPr lang="ru-RU" sz="1800" dirty="0" smtClean="0">
+                <a:solidFill>
+                  <a:schemeClr val="accent3">
+                    <a:lumMod val="75000"/>
+                  </a:schemeClr>
+                </a:solidFill>
+              </a:rPr>
+              <a:t>- </a:t>
+            </a:r>
+            <a:r>
+              <a:rPr lang="en-US" sz="1800" dirty="0" err="1">
+                <a:solidFill>
+                  <a:schemeClr val="accent3">
+                    <a:lumMod val="75000"/>
+                  </a:schemeClr>
+                </a:solidFill>
+              </a:rPr>
+              <a:t>telebot</a:t>
+            </a:r>
+            <a:endParaRPr lang="ru-RU" sz="1800" dirty="0">
+              <a:solidFill>
+                <a:schemeClr val="accent3">
+                  <a:lumMod val="75000"/>
+                </a:schemeClr>
+              </a:solidFill>
+            </a:endParaRPr>
+          </a:p>
+          <a:p>
+            <a:r>
+              <a:rPr lang="ru-RU" sz="1800" dirty="0" smtClean="0">
+                <a:solidFill>
+                  <a:schemeClr val="accent3">
+                    <a:lumMod val="75000"/>
+                  </a:schemeClr>
+                </a:solidFill>
+              </a:rPr>
+              <a:t>- </a:t>
+            </a:r>
+            <a:r>
+              <a:rPr lang="en-US" sz="1800" dirty="0">
+                <a:solidFill>
+                  <a:schemeClr val="accent3">
+                    <a:lumMod val="75000"/>
+                  </a:schemeClr>
+                </a:solidFill>
+              </a:rPr>
+              <a:t>requests</a:t>
+            </a:r>
+            <a:endParaRPr lang="ru-RU" sz="1800" dirty="0">
+              <a:solidFill>
+                <a:schemeClr val="accent3">
+                  <a:lumMod val="75000"/>
+                </a:schemeClr>
+              </a:solidFill>
+            </a:endParaRPr>
+          </a:p>
+          <a:p>
+            <a:r>
+              <a:rPr lang="ru-RU" sz="1800" dirty="0" smtClean="0">
+                <a:solidFill>
+                  <a:schemeClr val="accent3">
+                    <a:lumMod val="75000"/>
+                  </a:schemeClr>
+                </a:solidFill>
+              </a:rPr>
+              <a:t>- </a:t>
+            </a:r>
+            <a:r>
+              <a:rPr lang="en-US" sz="1800" dirty="0" smtClean="0">
+                <a:solidFill>
+                  <a:schemeClr val="accent3">
+                    <a:lumMod val="75000"/>
+                  </a:schemeClr>
+                </a:solidFill>
+              </a:rPr>
+              <a:t>Io</a:t>
+            </a:r>
+            <a:endParaRPr lang="ru-RU" sz="1800" dirty="0" smtClean="0">
+              <a:solidFill>
+                <a:schemeClr val="accent3">
+                  <a:lumMod val="75000"/>
+                </a:schemeClr>
+              </a:solidFill>
+            </a:endParaRPr>
+          </a:p>
+          <a:p>
+            <a:r>
+              <a:rPr lang="ru-RU" sz="1800" dirty="0" smtClean="0">
+                <a:solidFill>
+                  <a:schemeClr val="accent3">
+                    <a:lumMod val="75000"/>
+                  </a:schemeClr>
+                </a:solidFill>
+              </a:rPr>
+              <a:t>- </a:t>
+            </a:r>
+            <a:r>
+              <a:rPr lang="en-US" sz="1800" dirty="0" err="1" smtClean="0">
+                <a:solidFill>
+                  <a:schemeClr val="accent3">
+                    <a:lumMod val="75000"/>
+                  </a:schemeClr>
+                </a:solidFill>
+              </a:rPr>
+              <a:t>datetime</a:t>
+            </a:r>
+            <a:endParaRPr lang="ru-RU" sz="1800" dirty="0">
+              <a:solidFill>
+                <a:schemeClr val="accent3">
+                  <a:lumMod val="75000"/>
+                </a:schemeClr>
+              </a:solidFill>
+            </a:endParaRPr>
+          </a:p>
+        </p:txBody>
+      </p:sp>
+      <p:sp>
+        <p:nvSpPr>
+          <p:cNvPr id="6" name="Прямоугольник 5"/>
+          <p:cNvSpPr/>
+          <p:nvPr/>
+        </p:nvSpPr>
+        <p:spPr>
+          <a:xfrm>
+            <a:off x="5144572" y="278295"/>
+            <a:ext cx="3343444" cy="985270"/>
+          </a:xfrm>
+          <a:prstGeom prst="rect">
+            <a:avLst/>
+          </a:prstGeom>
+        </p:spPr>
+        <p:txBody>
+          <a:bodyPr wrap="square">
+            <a:spAutoFit/>
+          </a:bodyPr>
+          <a:lstStyle/>
+          <a:p>
+            <a:pPr indent="449580">
+              <a:lnSpc>
+                <a:spcPct val="107000"/>
+              </a:lnSpc>
+              <a:spcAft>
+                <a:spcPts val="800"/>
+              </a:spcAft>
+            </a:pPr>
+            <a:r>
+              <a:rPr lang="ru-RU" sz="2400" dirty="0" smtClean="0">
+                <a:solidFill>
+                  <a:schemeClr val="accent1">
+                    <a:lumMod val="60000"/>
+                    <a:lumOff val="40000"/>
+                  </a:schemeClr>
+                </a:solidFill>
+                <a:latin typeface="Times New Roman" panose="02020603050405020304" pitchFamily="18" charset="0"/>
+                <a:ea typeface="Calibri" panose="020F0502020204030204" pitchFamily="34" charset="0"/>
+                <a:cs typeface="Times New Roman" panose="02020603050405020304" pitchFamily="18" charset="0"/>
+              </a:rPr>
+              <a:t>Особенности</a:t>
+            </a:r>
+            <a:endParaRPr lang="en-US" sz="2400" dirty="0" smtClean="0">
+              <a:solidFill>
+                <a:schemeClr val="accent1">
+                  <a:lumMod val="60000"/>
+                  <a:lumOff val="40000"/>
+                </a:schemeClr>
+              </a:solidFill>
+              <a:latin typeface="Times New Roman" panose="02020603050405020304" pitchFamily="18" charset="0"/>
+              <a:ea typeface="Calibri" panose="020F0502020204030204" pitchFamily="34" charset="0"/>
+              <a:cs typeface="Times New Roman" panose="02020603050405020304" pitchFamily="18" charset="0"/>
+            </a:endParaRPr>
+          </a:p>
+          <a:p>
+            <a:pPr indent="449580">
+              <a:lnSpc>
+                <a:spcPct val="107000"/>
+              </a:lnSpc>
+              <a:spcAft>
+                <a:spcPts val="800"/>
+              </a:spcAft>
+            </a:pPr>
+            <a:r>
+              <a:rPr lang="ru-RU" sz="2400" dirty="0" smtClean="0">
+                <a:solidFill>
+                  <a:schemeClr val="accent1">
+                    <a:lumMod val="60000"/>
+                    <a:lumOff val="40000"/>
+                  </a:schemeClr>
+                </a:solidFill>
+                <a:latin typeface="Times New Roman" panose="02020603050405020304" pitchFamily="18" charset="0"/>
+                <a:ea typeface="Calibri" panose="020F0502020204030204" pitchFamily="34" charset="0"/>
+                <a:cs typeface="Times New Roman" panose="02020603050405020304" pitchFamily="18" charset="0"/>
+              </a:rPr>
+              <a:t> проекта</a:t>
+            </a:r>
+            <a:r>
+              <a:rPr lang="en-US" sz="2400" dirty="0" smtClean="0">
+                <a:solidFill>
+                  <a:schemeClr val="accent1">
+                    <a:lumMod val="60000"/>
+                    <a:lumOff val="40000"/>
+                  </a:schemeClr>
+                </a:solidFill>
+                <a:latin typeface="Times New Roman" panose="02020603050405020304" pitchFamily="18" charset="0"/>
+                <a:ea typeface="Calibri" panose="020F0502020204030204" pitchFamily="34" charset="0"/>
+                <a:cs typeface="Times New Roman" panose="02020603050405020304" pitchFamily="18" charset="0"/>
+              </a:rPr>
+              <a:t>:</a:t>
+            </a:r>
+            <a:endParaRPr lang="ru-RU" sz="3200" dirty="0">
+              <a:solidFill>
+                <a:schemeClr val="accent1">
+                  <a:lumMod val="60000"/>
+                  <a:lumOff val="40000"/>
+                </a:schemeClr>
+              </a:solidFill>
+              <a:effectLst/>
+              <a:latin typeface="Calibri" panose="020F0502020204030204" pitchFamily="34" charset="0"/>
+              <a:ea typeface="Calibri" panose="020F0502020204030204" pitchFamily="34" charset="0"/>
+              <a:cs typeface="Times New Roman" panose="02020603050405020304" pitchFamily="18" charset="0"/>
+            </a:endParaRPr>
+          </a:p>
+        </p:txBody>
+      </p:sp>
+      <p:sp>
+        <p:nvSpPr>
+          <p:cNvPr id="7" name="Прямоугольник 6"/>
+          <p:cNvSpPr/>
+          <p:nvPr/>
+        </p:nvSpPr>
+        <p:spPr>
+          <a:xfrm>
+            <a:off x="5645425" y="1486894"/>
+            <a:ext cx="5303520" cy="2961132"/>
+          </a:xfrm>
+          <a:prstGeom prst="rect">
+            <a:avLst/>
+          </a:prstGeom>
+        </p:spPr>
+        <p:txBody>
+          <a:bodyPr wrap="square">
+            <a:spAutoFit/>
+          </a:bodyPr>
+          <a:lstStyle/>
+          <a:p>
+            <a:pPr indent="449580" algn="ctr">
+              <a:lnSpc>
+                <a:spcPct val="107000"/>
+              </a:lnSpc>
+              <a:spcAft>
+                <a:spcPts val="800"/>
+              </a:spcAft>
+            </a:pPr>
+            <a:r>
+              <a:rPr lang="ru-RU" sz="2400" dirty="0" smtClean="0">
+                <a:solidFill>
+                  <a:schemeClr val="accent3">
+                    <a:lumMod val="75000"/>
+                  </a:schemeClr>
+                </a:solidFill>
+                <a:latin typeface="Calibri" panose="020F0502020204030204" pitchFamily="34" charset="0"/>
+                <a:ea typeface="Calibri" panose="020F0502020204030204" pitchFamily="34" charset="0"/>
+                <a:cs typeface="Times New Roman" panose="02020603050405020304" pitchFamily="18" charset="0"/>
+              </a:rPr>
+              <a:t>- Пользователь может развиваться 			через игровую среду по 					подготовке к экзаменам.</a:t>
+            </a:r>
+          </a:p>
+          <a:p>
+            <a:pPr indent="449580" algn="ctr">
+              <a:lnSpc>
+                <a:spcPct val="107000"/>
+              </a:lnSpc>
+              <a:spcAft>
+                <a:spcPts val="800"/>
+              </a:spcAft>
+            </a:pPr>
+            <a:r>
+              <a:rPr lang="ru-RU" sz="2400" dirty="0" smtClean="0">
+                <a:solidFill>
+                  <a:schemeClr val="accent3">
+                    <a:lumMod val="75000"/>
+                  </a:schemeClr>
+                </a:solidFill>
+                <a:latin typeface="Calibri" panose="020F0502020204030204" pitchFamily="34" charset="0"/>
+                <a:ea typeface="Calibri" panose="020F0502020204030204" pitchFamily="34" charset="0"/>
+                <a:cs typeface="Times New Roman" panose="02020603050405020304" pitchFamily="18" charset="0"/>
+              </a:rPr>
+              <a:t>- Бот общается дружелюбно и с 			ноткой шуток, из-за чего 				человек не будет ощущать 				рутинную работу 	в подготовке</a:t>
+            </a:r>
+            <a:endParaRPr lang="ru-RU" sz="2400" dirty="0">
+              <a:solidFill>
+                <a:schemeClr val="accent3">
+                  <a:lumMod val="75000"/>
+                </a:schemeClr>
+              </a:solidFill>
+              <a:effectLst/>
+              <a:latin typeface="Calibri" panose="020F0502020204030204" pitchFamily="34" charset="0"/>
+              <a:ea typeface="Calibri" panose="020F0502020204030204" pitchFamily="34" charset="0"/>
+              <a:cs typeface="Times New Roman" panose="02020603050405020304" pitchFamily="18" charset="0"/>
+            </a:endParaRPr>
+          </a:p>
+        </p:txBody>
+      </p:sp>
+    </p:spTree>
+    <p:extLst>
+      <p:ext uri="{BB962C8B-B14F-4D97-AF65-F5344CB8AC3E}">
+        <p14:creationId xmlns:p14="http://schemas.microsoft.com/office/powerpoint/2010/main" val="3593975807"/>
+      </p:ext>
+    </p:extLst>
+  </p:cSld>
+  <p:clrMapOvr>
+    <a:masterClrMapping/>
+  </p:clrMapOvr>
+</p:sld>
+</file>
+
+<file path=ppt/slides/slide4.xml><?xml version="1.0" encoding="utf-8"?>
+<p:sld xmlns:a="http://schemas.openxmlformats.org/drawingml/2006/main" xmlns:r="http://schemas.openxmlformats.org/officeDocument/2006/relationships" xmlns:p="http://schemas.openxmlformats.org/presentationml/2006/main">
+  <p:cSld>
+    <p:spTree>
+      <p:nvGrpSpPr>
+        <p:cNvPr id="1" name=""/>
+        <p:cNvGrpSpPr/>
+        <p:nvPr/>
+      </p:nvGrpSpPr>
+      <p:grpSpPr>
+        <a:xfrm>
+          <a:off x="0" y="0"/>
+          <a:ext cx="0" cy="0"/>
+          <a:chOff x="0" y="0"/>
+          <a:chExt cx="0" cy="0"/>
+        </a:xfrm>
+      </p:grpSpPr>
+      <p:sp>
+        <p:nvSpPr>
+          <p:cNvPr id="3" name="Текст 2"/>
+          <p:cNvSpPr>
+            <a:spLocks noGrp="1"/>
+          </p:cNvSpPr>
+          <p:nvPr>
+            <p:ph type="body" sz="half" idx="2"/>
+          </p:nvPr>
+        </p:nvSpPr>
+        <p:spPr>
+          <a:xfrm>
+            <a:off x="284997" y="86949"/>
+            <a:ext cx="2354836" cy="803598"/>
+          </a:xfrm>
+        </p:spPr>
+        <p:txBody>
+          <a:bodyPr>
+            <a:normAutofit/>
+          </a:bodyPr>
+          <a:lstStyle/>
+          <a:p>
+            <a:r>
+              <a:rPr lang="ru-RU" sz="2400" dirty="0" smtClean="0">
+                <a:solidFill>
+                  <a:schemeClr val="accent4">
+                    <a:lumMod val="75000"/>
+                  </a:schemeClr>
+                </a:solidFill>
+              </a:rPr>
+              <a:t>Заключение</a:t>
+            </a:r>
+            <a:r>
+              <a:rPr lang="en-US" sz="2400" dirty="0" smtClean="0">
+                <a:solidFill>
+                  <a:schemeClr val="accent4">
+                    <a:lumMod val="75000"/>
+                  </a:schemeClr>
+                </a:solidFill>
+              </a:rPr>
+              <a:t>:</a:t>
+            </a:r>
+            <a:endParaRPr lang="ru-RU" sz="2400" dirty="0">
+              <a:solidFill>
+                <a:schemeClr val="accent4">
+                  <a:lumMod val="75000"/>
+                </a:schemeClr>
+              </a:solidFill>
+            </a:endParaRPr>
+          </a:p>
+        </p:txBody>
+      </p:sp>
+      <p:sp>
+        <p:nvSpPr>
+          <p:cNvPr id="5" name="Текст 2"/>
+          <p:cNvSpPr txBox="1">
+            <a:spLocks/>
+          </p:cNvSpPr>
+          <p:nvPr/>
+        </p:nvSpPr>
+        <p:spPr>
+          <a:xfrm>
+            <a:off x="849539" y="850791"/>
+            <a:ext cx="9781355" cy="3967701"/>
+          </a:xfrm>
+          <a:prstGeom prst="rect">
+            <a:avLst/>
+          </a:prstGeom>
+        </p:spPr>
+        <p:txBody>
+          <a:bodyPr vert="horz" lIns="91440" tIns="45720" rIns="91440" bIns="45720" rtlCol="0" anchor="ctr">
+            <a:normAutofit/>
+          </a:bodyPr>
+          <a:lstStyle>
+            <a:lvl1pPr marL="0" indent="0" algn="l" defTabSz="914400" rtl="0" eaLnBrk="1" latinLnBrk="0" hangingPunct="1">
+              <a:lnSpc>
+                <a:spcPct val="90000"/>
+              </a:lnSpc>
+              <a:spcBef>
+                <a:spcPts val="1000"/>
+              </a:spcBef>
+              <a:buFont typeface="Arial" panose="020B0604020202020204" pitchFamily="34" charset="0"/>
+              <a:buNone/>
+              <a:defRPr sz="1600" kern="1200">
+                <a:solidFill>
+                  <a:schemeClr val="tx1"/>
+                </a:solidFill>
+                <a:latin typeface="+mn-lt"/>
+                <a:ea typeface="+mn-ea"/>
+                <a:cs typeface="+mn-cs"/>
+              </a:defRPr>
+            </a:lvl1pPr>
+            <a:lvl2pPr marL="457200" indent="0" algn="l" defTabSz="914400" rtl="0" eaLnBrk="1" latinLnBrk="0" hangingPunct="1">
+              <a:lnSpc>
+                <a:spcPct val="90000"/>
+              </a:lnSpc>
+              <a:spcBef>
+                <a:spcPts val="500"/>
+              </a:spcBef>
+              <a:buFont typeface="Arial" panose="020B0604020202020204" pitchFamily="34" charset="0"/>
+              <a:buNone/>
+              <a:defRPr sz="1400" kern="1200">
+                <a:solidFill>
+                  <a:schemeClr val="tx1"/>
+                </a:solidFill>
+                <a:latin typeface="+mn-lt"/>
+                <a:ea typeface="+mn-ea"/>
+                <a:cs typeface="+mn-cs"/>
+              </a:defRPr>
+            </a:lvl2pPr>
+            <a:lvl3pPr marL="914400" indent="0" algn="l" defTabSz="914400" rtl="0" eaLnBrk="1" latinLnBrk="0" hangingPunct="1">
+              <a:lnSpc>
+                <a:spcPct val="90000"/>
+              </a:lnSpc>
+              <a:spcBef>
+                <a:spcPts val="500"/>
+              </a:spcBef>
+              <a:buFont typeface="Arial" panose="020B0604020202020204" pitchFamily="34" charset="0"/>
+              <a:buNone/>
+              <a:defRPr sz="1200" kern="1200">
+                <a:solidFill>
+                  <a:schemeClr val="tx1"/>
+                </a:solidFill>
+                <a:latin typeface="+mn-lt"/>
+                <a:ea typeface="+mn-ea"/>
+                <a:cs typeface="+mn-cs"/>
+              </a:defRPr>
+            </a:lvl3pPr>
+            <a:lvl4pPr marL="1371600" indent="0" algn="l" defTabSz="914400" rtl="0" eaLnBrk="1" latinLnBrk="0" hangingPunct="1">
+              <a:lnSpc>
+                <a:spcPct val="90000"/>
+              </a:lnSpc>
+              <a:spcBef>
+                <a:spcPts val="500"/>
+              </a:spcBef>
+              <a:buFont typeface="Arial" panose="020B0604020202020204" pitchFamily="34" charset="0"/>
+              <a:buNone/>
+              <a:defRPr sz="1000" kern="1200">
+                <a:solidFill>
+                  <a:schemeClr val="tx1"/>
+                </a:solidFill>
+                <a:latin typeface="+mn-lt"/>
+                <a:ea typeface="+mn-ea"/>
+                <a:cs typeface="+mn-cs"/>
+              </a:defRPr>
+            </a:lvl4pPr>
+            <a:lvl5pPr marL="1828800" indent="0" algn="l" defTabSz="914400" rtl="0" eaLnBrk="1" latinLnBrk="0" hangingPunct="1">
+              <a:lnSpc>
+                <a:spcPct val="90000"/>
+              </a:lnSpc>
+              <a:spcBef>
+                <a:spcPts val="500"/>
+              </a:spcBef>
+              <a:buFont typeface="Arial" panose="020B0604020202020204" pitchFamily="34" charset="0"/>
+              <a:buNone/>
+              <a:defRPr sz="1000" kern="1200">
+                <a:solidFill>
+                  <a:schemeClr val="tx1"/>
+                </a:solidFill>
+                <a:latin typeface="+mn-lt"/>
+                <a:ea typeface="+mn-ea"/>
+                <a:cs typeface="+mn-cs"/>
+              </a:defRPr>
+            </a:lvl5pPr>
+            <a:lvl6pPr marL="2286000" indent="0" algn="l" defTabSz="914400" rtl="0" eaLnBrk="1" latinLnBrk="0" hangingPunct="1">
+              <a:lnSpc>
+                <a:spcPct val="90000"/>
+              </a:lnSpc>
+              <a:spcBef>
+                <a:spcPts val="500"/>
+              </a:spcBef>
+              <a:buFont typeface="Arial" panose="020B0604020202020204" pitchFamily="34" charset="0"/>
+              <a:buNone/>
+              <a:defRPr sz="1000" kern="1200">
+                <a:solidFill>
+                  <a:schemeClr val="tx1"/>
+                </a:solidFill>
+                <a:latin typeface="+mn-lt"/>
+                <a:ea typeface="+mn-ea"/>
+                <a:cs typeface="+mn-cs"/>
+              </a:defRPr>
+            </a:lvl6pPr>
+            <a:lvl7pPr marL="2743200" indent="0" algn="l" defTabSz="914400" rtl="0" eaLnBrk="1" latinLnBrk="0" hangingPunct="1">
+              <a:lnSpc>
+                <a:spcPct val="90000"/>
+              </a:lnSpc>
+              <a:spcBef>
+                <a:spcPts val="500"/>
+              </a:spcBef>
+              <a:buFont typeface="Arial" panose="020B0604020202020204" pitchFamily="34" charset="0"/>
+              <a:buNone/>
+              <a:defRPr sz="1000" kern="1200">
+                <a:solidFill>
+                  <a:schemeClr val="tx1"/>
+                </a:solidFill>
+                <a:latin typeface="+mn-lt"/>
+                <a:ea typeface="+mn-ea"/>
+                <a:cs typeface="+mn-cs"/>
+              </a:defRPr>
+            </a:lvl7pPr>
+            <a:lvl8pPr marL="3200400" indent="0" algn="l" defTabSz="914400" rtl="0" eaLnBrk="1" latinLnBrk="0" hangingPunct="1">
+              <a:lnSpc>
+                <a:spcPct val="90000"/>
+              </a:lnSpc>
+              <a:spcBef>
+                <a:spcPts val="500"/>
+              </a:spcBef>
+              <a:buFont typeface="Arial" panose="020B0604020202020204" pitchFamily="34" charset="0"/>
+              <a:buNone/>
+              <a:defRPr sz="1000" kern="1200">
+                <a:solidFill>
+                  <a:schemeClr val="tx1"/>
+                </a:solidFill>
+                <a:latin typeface="+mn-lt"/>
+                <a:ea typeface="+mn-ea"/>
+                <a:cs typeface="+mn-cs"/>
+              </a:defRPr>
+            </a:lvl8pPr>
+            <a:lvl9pPr marL="3657600" indent="0" algn="l" defTabSz="914400" rtl="0" eaLnBrk="1" latinLnBrk="0" hangingPunct="1">
+              <a:lnSpc>
+                <a:spcPct val="90000"/>
+              </a:lnSpc>
+              <a:spcBef>
+                <a:spcPts val="500"/>
+              </a:spcBef>
+              <a:buFont typeface="Arial" panose="020B0604020202020204" pitchFamily="34" charset="0"/>
+              <a:buNone/>
+              <a:defRPr sz="1000" kern="1200">
+                <a:solidFill>
+                  <a:schemeClr val="tx1"/>
+                </a:solidFill>
+                <a:latin typeface="+mn-lt"/>
+                <a:ea typeface="+mn-ea"/>
+                <a:cs typeface="+mn-cs"/>
+              </a:defRPr>
+            </a:lvl9pPr>
+          </a:lstStyle>
+          <a:p>
+            <a:r>
+              <a:rPr lang="ru-RU" sz="2000" dirty="0" smtClean="0">
+                <a:solidFill>
+                  <a:schemeClr val="accent1">
+                    <a:lumMod val="60000"/>
+                    <a:lumOff val="40000"/>
+                  </a:schemeClr>
+                </a:solidFill>
+              </a:rPr>
+              <a:t>Запланированные доработки</a:t>
+            </a:r>
+            <a:r>
+              <a:rPr lang="en-US" sz="2000" dirty="0" smtClean="0">
+                <a:solidFill>
+                  <a:schemeClr val="accent1">
+                    <a:lumMod val="60000"/>
+                    <a:lumOff val="40000"/>
+                  </a:schemeClr>
+                </a:solidFill>
+              </a:rPr>
+              <a:t>:</a:t>
+            </a:r>
+          </a:p>
+          <a:p>
+            <a:r>
+              <a:rPr lang="en-US" dirty="0"/>
+              <a:t>	</a:t>
+            </a:r>
+            <a:r>
+              <a:rPr lang="en-US" dirty="0" smtClean="0">
+                <a:solidFill>
+                  <a:schemeClr val="accent3">
+                    <a:lumMod val="75000"/>
+                  </a:schemeClr>
+                </a:solidFill>
+              </a:rPr>
+              <a:t>- </a:t>
+            </a:r>
+            <a:r>
+              <a:rPr lang="ru-RU" dirty="0" smtClean="0">
+                <a:solidFill>
+                  <a:schemeClr val="accent3">
+                    <a:lumMod val="75000"/>
+                  </a:schemeClr>
+                </a:solidFill>
+              </a:rPr>
+              <a:t>сделать, чтобы человек мог писать сам код, а не только ответы в виде одного слова 		или цифры</a:t>
+            </a:r>
+          </a:p>
+          <a:p>
+            <a:r>
+              <a:rPr lang="ru-RU" dirty="0">
+                <a:solidFill>
+                  <a:schemeClr val="accent3">
+                    <a:lumMod val="75000"/>
+                  </a:schemeClr>
+                </a:solidFill>
+              </a:rPr>
+              <a:t>	</a:t>
+            </a:r>
+            <a:r>
+              <a:rPr lang="ru-RU" dirty="0" smtClean="0">
+                <a:solidFill>
+                  <a:schemeClr val="accent3">
+                    <a:lumMod val="75000"/>
+                  </a:schemeClr>
+                </a:solidFill>
+              </a:rPr>
+              <a:t>- усовершенствовать профиль</a:t>
+            </a:r>
+          </a:p>
+          <a:p>
+            <a:r>
+              <a:rPr lang="ru-RU" dirty="0">
+                <a:solidFill>
+                  <a:schemeClr val="accent3">
+                    <a:lumMod val="75000"/>
+                  </a:schemeClr>
+                </a:solidFill>
+              </a:rPr>
+              <a:t>	</a:t>
+            </a:r>
+            <a:r>
+              <a:rPr lang="ru-RU" dirty="0" smtClean="0">
+                <a:solidFill>
+                  <a:schemeClr val="accent3">
+                    <a:lumMod val="75000"/>
+                  </a:schemeClr>
+                </a:solidFill>
+              </a:rPr>
+              <a:t>- создать более масштабный сайт</a:t>
+            </a:r>
+          </a:p>
+          <a:p>
+            <a:r>
+              <a:rPr lang="ru-RU" dirty="0" smtClean="0">
+                <a:solidFill>
+                  <a:schemeClr val="accent3">
+                    <a:lumMod val="75000"/>
+                  </a:schemeClr>
+                </a:solidFill>
+              </a:rPr>
+              <a:t> 	- увеличить диалоги бота</a:t>
+            </a:r>
+          </a:p>
+          <a:p>
+            <a:endParaRPr lang="en-US" dirty="0" smtClean="0">
+              <a:solidFill>
+                <a:schemeClr val="accent3">
+                  <a:lumMod val="75000"/>
+                </a:schemeClr>
+              </a:solidFill>
+            </a:endParaRPr>
+          </a:p>
+          <a:p>
+            <a:r>
+              <a:rPr lang="ru-RU" sz="2000" dirty="0" smtClean="0">
+                <a:solidFill>
+                  <a:schemeClr val="accent1">
+                    <a:lumMod val="60000"/>
+                    <a:lumOff val="40000"/>
+                  </a:schemeClr>
+                </a:solidFill>
+              </a:rPr>
+              <a:t>Вывод</a:t>
+            </a:r>
+            <a:r>
+              <a:rPr lang="en-US" sz="2000" dirty="0" smtClean="0">
+                <a:solidFill>
+                  <a:schemeClr val="accent1">
+                    <a:lumMod val="60000"/>
+                    <a:lumOff val="40000"/>
+                  </a:schemeClr>
+                </a:solidFill>
+              </a:rPr>
+              <a:t>:</a:t>
+            </a:r>
+          </a:p>
+          <a:p>
+            <a:r>
+              <a:rPr lang="en-US" dirty="0">
+                <a:solidFill>
+                  <a:schemeClr val="accent3">
+                    <a:lumMod val="75000"/>
+                  </a:schemeClr>
+                </a:solidFill>
+              </a:rPr>
+              <a:t>	</a:t>
+            </a:r>
+            <a:r>
+              <a:rPr lang="ru-RU" dirty="0" smtClean="0">
+                <a:solidFill>
+                  <a:schemeClr val="accent3">
+                    <a:lumMod val="75000"/>
+                  </a:schemeClr>
+                </a:solidFill>
+              </a:rPr>
+              <a:t>Я думаю, что мы достигли того результата, которого хотели. Любой человек может попробовать себя в решение задач из </a:t>
+            </a:r>
+            <a:r>
+              <a:rPr lang="ru-RU" dirty="0" err="1" smtClean="0">
+                <a:solidFill>
+                  <a:schemeClr val="accent3">
+                    <a:lumMod val="75000"/>
+                  </a:schemeClr>
+                </a:solidFill>
+              </a:rPr>
+              <a:t>огэ</a:t>
+            </a:r>
+            <a:r>
+              <a:rPr lang="en-US" dirty="0" smtClean="0">
+                <a:solidFill>
+                  <a:schemeClr val="accent3">
+                    <a:lumMod val="75000"/>
+                  </a:schemeClr>
+                </a:solidFill>
+              </a:rPr>
+              <a:t>/</a:t>
+            </a:r>
+            <a:r>
+              <a:rPr lang="ru-RU" dirty="0" err="1" smtClean="0">
+                <a:solidFill>
+                  <a:schemeClr val="accent3">
+                    <a:lumMod val="75000"/>
+                  </a:schemeClr>
+                </a:solidFill>
+              </a:rPr>
+              <a:t>егэ</a:t>
+            </a:r>
+            <a:r>
+              <a:rPr lang="ru-RU" dirty="0" smtClean="0">
+                <a:solidFill>
+                  <a:schemeClr val="accent3">
+                    <a:lumMod val="75000"/>
+                  </a:schemeClr>
+                </a:solidFill>
+              </a:rPr>
+              <a:t> по программированию. </a:t>
+            </a:r>
+            <a:r>
+              <a:rPr lang="ru-RU" dirty="0">
+                <a:solidFill>
+                  <a:schemeClr val="accent3">
+                    <a:lumMod val="75000"/>
+                  </a:schemeClr>
+                </a:solidFill>
+              </a:rPr>
+              <a:t>П</a:t>
+            </a:r>
+            <a:r>
+              <a:rPr lang="ru-RU" dirty="0" smtClean="0">
+                <a:solidFill>
+                  <a:schemeClr val="accent3">
+                    <a:lumMod val="75000"/>
+                  </a:schemeClr>
+                </a:solidFill>
+              </a:rPr>
+              <a:t>оставленная цель выполнена.</a:t>
+            </a:r>
+            <a:endParaRPr lang="ru-RU" dirty="0">
+              <a:solidFill>
+                <a:schemeClr val="accent3">
+                  <a:lumMod val="75000"/>
+                </a:schemeClr>
+              </a:solidFill>
+            </a:endParaRPr>
+          </a:p>
+        </p:txBody>
+      </p:sp>
+    </p:spTree>
+    <p:extLst>
+      <p:ext uri="{BB962C8B-B14F-4D97-AF65-F5344CB8AC3E}">
+        <p14:creationId xmlns:p14="http://schemas.microsoft.com/office/powerpoint/2010/main" val="2493739020"/>
+      </p:ext>
+    </p:extLst>
+  </p:cSld>
+  <p:clrMapOvr>
+    <a:masterClrMapping/>
+  </p:clrMapOvr>
+</p:sld>
+</file>
+
+<file path=ppt/slides/slide5.xml><?xml version="1.0" encoding="utf-8"?>
+<p:sld xmlns:a="http://schemas.openxmlformats.org/drawingml/2006/main" xmlns:r="http://schemas.openxmlformats.org/officeDocument/2006/relationships" xmlns:p="http://schemas.openxmlformats.org/presentationml/2006/main">
+  <p:cSld>
+    <p:spTree>
+      <p:nvGrpSpPr>
+        <p:cNvPr id="1" name=""/>
+        <p:cNvGrpSpPr/>
+        <p:nvPr/>
+      </p:nvGrpSpPr>
+      <p:grpSpPr>
+        <a:xfrm>
+          <a:off x="0" y="0"/>
+          <a:ext cx="0" cy="0"/>
+          <a:chOff x="0" y="0"/>
+          <a:chExt cx="0" cy="0"/>
+        </a:xfrm>
+      </p:grpSpPr>
+      <p:pic>
+        <p:nvPicPr>
+          <p:cNvPr id="2" name="Рисунок 1"/>
+          <p:cNvPicPr>
+            <a:picLocks noChangeAspect="1"/>
+          </p:cNvPicPr>
+          <p:nvPr/>
+        </p:nvPicPr>
+        <p:blipFill>
+          <a:blip r:embed="rId2"/>
+          <a:stretch>
+            <a:fillRect/>
+          </a:stretch>
+        </p:blipFill>
+        <p:spPr>
+          <a:xfrm>
+            <a:off x="0" y="-14754"/>
+            <a:ext cx="12191999" cy="6887507"/>
+          </a:xfrm>
+          <a:prstGeom prst="rect">
+            <a:avLst/>
+          </a:prstGeom>
+        </p:spPr>
+      </p:pic>
+    </p:spTree>
+    <p:extLst>
+      <p:ext uri="{BB962C8B-B14F-4D97-AF65-F5344CB8AC3E}">
+        <p14:creationId xmlns:p14="http://schemas.microsoft.com/office/powerpoint/2010/main" val="3868728448"/>
       </p:ext>
     </p:extLst>
   </p:cSld>

</xml_diff>